<commit_message>
added about and minor edits
</commit_message>
<xml_diff>
--- a/Docs/_site/presentations/Presentations_1.pptx
+++ b/Docs/_site/presentations/Presentations_1.pptx
@@ -3180,12 +3180,7 @@
             <p:ph type="title"/>
           </p:nvPr>
         </p:nvSpPr>
-        <p:spPr>
-          <a:xfrm>
-            <a:off x="722313" y="3305176"/>
-            <a:ext cx="7772400" cy="1021556"/>
-          </a:xfrm>
-        </p:spPr>
+        <p:spPr/>
         <p:txBody>
           <a:bodyPr/>
           <a:lstStyle/>

</xml_diff>